<commit_message>
Images for menu bar and index
</commit_message>
<xml_diff>
--- a/help/images/ImagesForAmadonHelp.pptx
+++ b/help/images/ImagesForAmadonHelp.pptx
@@ -7,7 +7,9 @@
   <p:sldIdLst>
     <p:sldId id="257" r:id="rId2"/>
     <p:sldId id="258" r:id="rId3"/>
-    <p:sldId id="259" r:id="rId4"/>
+    <p:sldId id="260" r:id="rId4"/>
+    <p:sldId id="261" r:id="rId5"/>
+    <p:sldId id="259" r:id="rId6"/>
   </p:sldIdLst>
   <p:sldSz cx="12192000" cy="6858000"/>
   <p:notesSz cx="6858000" cy="9144000"/>
@@ -3919,6 +3921,1294 @@
           <p:cNvPr id="3" name="Picture 2">
             <a:extLst>
               <a:ext uri="{FF2B5EF4-FFF2-40B4-BE49-F238E27FC236}">
+                <a16:creationId xmlns:a16="http://schemas.microsoft.com/office/drawing/2014/main" id="{8140AEE0-BDD5-7C70-5651-02A69D5E4F42}"/>
+              </a:ext>
+            </a:extLst>
+          </p:cNvPr>
+          <p:cNvPicPr>
+            <a:picLocks noChangeAspect="1"/>
+          </p:cNvPicPr>
+          <p:nvPr/>
+        </p:nvPicPr>
+        <p:blipFill>
+          <a:blip r:embed="rId2"/>
+          <a:stretch>
+            <a:fillRect/>
+          </a:stretch>
+        </p:blipFill>
+        <p:spPr>
+          <a:xfrm>
+            <a:off x="1440981" y="1981666"/>
+            <a:ext cx="8668195" cy="863644"/>
+          </a:xfrm>
+          <a:prstGeom prst="rect">
+            <a:avLst/>
+          </a:prstGeom>
+        </p:spPr>
+      </p:pic>
+      <p:pic>
+        <p:nvPicPr>
+          <p:cNvPr id="5" name="Picture 4">
+            <a:extLst>
+              <a:ext uri="{FF2B5EF4-FFF2-40B4-BE49-F238E27FC236}">
+                <a16:creationId xmlns:a16="http://schemas.microsoft.com/office/drawing/2014/main" id="{3D61878B-47E3-CE0E-AB21-C0A7539EB33D}"/>
+              </a:ext>
+            </a:extLst>
+          </p:cNvPr>
+          <p:cNvPicPr>
+            <a:picLocks noChangeAspect="1"/>
+          </p:cNvPicPr>
+          <p:nvPr/>
+        </p:nvPicPr>
+        <p:blipFill>
+          <a:blip r:embed="rId2"/>
+          <a:stretch>
+            <a:fillRect/>
+          </a:stretch>
+        </p:blipFill>
+        <p:spPr>
+          <a:xfrm>
+            <a:off x="1440982" y="557312"/>
+            <a:ext cx="8668195" cy="863644"/>
+          </a:xfrm>
+          <a:prstGeom prst="rect">
+            <a:avLst/>
+          </a:prstGeom>
+        </p:spPr>
+      </p:pic>
+      <p:grpSp>
+        <p:nvGrpSpPr>
+          <p:cNvPr id="18" name="Group 17">
+            <a:extLst>
+              <a:ext uri="{FF2B5EF4-FFF2-40B4-BE49-F238E27FC236}">
+                <a16:creationId xmlns:a16="http://schemas.microsoft.com/office/drawing/2014/main" id="{F673FE9B-A7DE-901E-76FF-9EA109171C98}"/>
+              </a:ext>
+            </a:extLst>
+          </p:cNvPr>
+          <p:cNvGrpSpPr/>
+          <p:nvPr/>
+        </p:nvGrpSpPr>
+        <p:grpSpPr>
+          <a:xfrm>
+            <a:off x="2612343" y="2593731"/>
+            <a:ext cx="296883" cy="753188"/>
+            <a:chOff x="2612343" y="2593731"/>
+            <a:chExt cx="296883" cy="753188"/>
+          </a:xfrm>
+        </p:grpSpPr>
+        <p:sp>
+          <p:nvSpPr>
+            <p:cNvPr id="14" name="Flowchart: Connector 13">
+              <a:extLst>
+                <a:ext uri="{FF2B5EF4-FFF2-40B4-BE49-F238E27FC236}">
+                  <a16:creationId xmlns:a16="http://schemas.microsoft.com/office/drawing/2014/main" id="{7488019B-2F42-031A-8D4F-D074B0380679}"/>
+                </a:ext>
+              </a:extLst>
+            </p:cNvPr>
+            <p:cNvSpPr/>
+            <p:nvPr/>
+          </p:nvSpPr>
+          <p:spPr>
+            <a:xfrm>
+              <a:off x="2612343" y="3081704"/>
+              <a:ext cx="296883" cy="265215"/>
+            </a:xfrm>
+            <a:prstGeom prst="flowChartConnector">
+              <a:avLst/>
+            </a:prstGeom>
+          </p:spPr>
+          <p:style>
+            <a:lnRef idx="2">
+              <a:schemeClr val="accent1">
+                <a:shade val="15000"/>
+              </a:schemeClr>
+            </a:lnRef>
+            <a:fillRef idx="1">
+              <a:schemeClr val="accent1"/>
+            </a:fillRef>
+            <a:effectRef idx="0">
+              <a:schemeClr val="accent1"/>
+            </a:effectRef>
+            <a:fontRef idx="minor">
+              <a:schemeClr val="lt1"/>
+            </a:fontRef>
+          </p:style>
+          <p:txBody>
+            <a:bodyPr rtlCol="0" anchor="ctr"/>
+            <a:lstStyle/>
+            <a:p>
+              <a:pPr algn="ctr"/>
+              <a:r>
+                <a:rPr lang="en-GB" dirty="0"/>
+                <a:t>1</a:t>
+              </a:r>
+            </a:p>
+          </p:txBody>
+        </p:sp>
+        <p:cxnSp>
+          <p:nvCxnSpPr>
+            <p:cNvPr id="15" name="Straight Arrow Connector 14">
+              <a:extLst>
+                <a:ext uri="{FF2B5EF4-FFF2-40B4-BE49-F238E27FC236}">
+                  <a16:creationId xmlns:a16="http://schemas.microsoft.com/office/drawing/2014/main" id="{83BB88CE-0288-F0BC-8BAD-070A8ADCF46D}"/>
+                </a:ext>
+              </a:extLst>
+            </p:cNvPr>
+            <p:cNvCxnSpPr>
+              <a:cxnSpLocks/>
+              <a:endCxn id="14" idx="0"/>
+            </p:cNvCxnSpPr>
+            <p:nvPr/>
+          </p:nvCxnSpPr>
+          <p:spPr>
+            <a:xfrm flipH="1">
+              <a:off x="2760785" y="2593731"/>
+              <a:ext cx="148441" cy="487973"/>
+            </a:xfrm>
+            <a:prstGeom prst="straightConnector1">
+              <a:avLst/>
+            </a:prstGeom>
+            <a:ln w="19050">
+              <a:solidFill>
+                <a:srgbClr val="FF0000"/>
+              </a:solidFill>
+              <a:tailEnd type="triangle"/>
+            </a:ln>
+          </p:spPr>
+          <p:style>
+            <a:lnRef idx="1">
+              <a:schemeClr val="accent1"/>
+            </a:lnRef>
+            <a:fillRef idx="0">
+              <a:schemeClr val="accent1"/>
+            </a:fillRef>
+            <a:effectRef idx="0">
+              <a:schemeClr val="accent1"/>
+            </a:effectRef>
+            <a:fontRef idx="minor">
+              <a:schemeClr val="tx1"/>
+            </a:fontRef>
+          </p:style>
+        </p:cxnSp>
+      </p:grpSp>
+      <p:grpSp>
+        <p:nvGrpSpPr>
+          <p:cNvPr id="20" name="Group 19">
+            <a:extLst>
+              <a:ext uri="{FF2B5EF4-FFF2-40B4-BE49-F238E27FC236}">
+                <a16:creationId xmlns:a16="http://schemas.microsoft.com/office/drawing/2014/main" id="{E180B11E-6D9A-C17F-E7F1-B22CDD6E784E}"/>
+              </a:ext>
+            </a:extLst>
+          </p:cNvPr>
+          <p:cNvGrpSpPr/>
+          <p:nvPr/>
+        </p:nvGrpSpPr>
+        <p:grpSpPr>
+          <a:xfrm>
+            <a:off x="4248956" y="2593731"/>
+            <a:ext cx="296883" cy="753188"/>
+            <a:chOff x="2612343" y="2593731"/>
+            <a:chExt cx="296883" cy="753188"/>
+          </a:xfrm>
+        </p:grpSpPr>
+        <p:sp>
+          <p:nvSpPr>
+            <p:cNvPr id="21" name="Flowchart: Connector 20">
+              <a:extLst>
+                <a:ext uri="{FF2B5EF4-FFF2-40B4-BE49-F238E27FC236}">
+                  <a16:creationId xmlns:a16="http://schemas.microsoft.com/office/drawing/2014/main" id="{C09A8E0E-392E-AC9E-E5EF-6633BACF26B5}"/>
+                </a:ext>
+              </a:extLst>
+            </p:cNvPr>
+            <p:cNvSpPr/>
+            <p:nvPr/>
+          </p:nvSpPr>
+          <p:spPr>
+            <a:xfrm>
+              <a:off x="2612343" y="3081704"/>
+              <a:ext cx="296883" cy="265215"/>
+            </a:xfrm>
+            <a:prstGeom prst="flowChartConnector">
+              <a:avLst/>
+            </a:prstGeom>
+          </p:spPr>
+          <p:style>
+            <a:lnRef idx="2">
+              <a:schemeClr val="accent1">
+                <a:shade val="15000"/>
+              </a:schemeClr>
+            </a:lnRef>
+            <a:fillRef idx="1">
+              <a:schemeClr val="accent1"/>
+            </a:fillRef>
+            <a:effectRef idx="0">
+              <a:schemeClr val="accent1"/>
+            </a:effectRef>
+            <a:fontRef idx="minor">
+              <a:schemeClr val="lt1"/>
+            </a:fontRef>
+          </p:style>
+          <p:txBody>
+            <a:bodyPr rtlCol="0" anchor="ctr"/>
+            <a:lstStyle/>
+            <a:p>
+              <a:pPr algn="ctr"/>
+              <a:r>
+                <a:rPr lang="en-GB" dirty="0"/>
+                <a:t>2</a:t>
+              </a:r>
+            </a:p>
+          </p:txBody>
+        </p:sp>
+        <p:cxnSp>
+          <p:nvCxnSpPr>
+            <p:cNvPr id="22" name="Straight Arrow Connector 21">
+              <a:extLst>
+                <a:ext uri="{FF2B5EF4-FFF2-40B4-BE49-F238E27FC236}">
+                  <a16:creationId xmlns:a16="http://schemas.microsoft.com/office/drawing/2014/main" id="{236E54B9-B66D-848A-78E0-FC59E459804C}"/>
+                </a:ext>
+              </a:extLst>
+            </p:cNvPr>
+            <p:cNvCxnSpPr>
+              <a:cxnSpLocks/>
+              <a:endCxn id="21" idx="0"/>
+            </p:cNvCxnSpPr>
+            <p:nvPr/>
+          </p:nvCxnSpPr>
+          <p:spPr>
+            <a:xfrm flipH="1">
+              <a:off x="2760785" y="2593731"/>
+              <a:ext cx="148441" cy="487973"/>
+            </a:xfrm>
+            <a:prstGeom prst="straightConnector1">
+              <a:avLst/>
+            </a:prstGeom>
+            <a:ln w="19050">
+              <a:solidFill>
+                <a:srgbClr val="FF0000"/>
+              </a:solidFill>
+              <a:tailEnd type="triangle"/>
+            </a:ln>
+          </p:spPr>
+          <p:style>
+            <a:lnRef idx="1">
+              <a:schemeClr val="accent1"/>
+            </a:lnRef>
+            <a:fillRef idx="0">
+              <a:schemeClr val="accent1"/>
+            </a:fillRef>
+            <a:effectRef idx="0">
+              <a:schemeClr val="accent1"/>
+            </a:effectRef>
+            <a:fontRef idx="minor">
+              <a:schemeClr val="tx1"/>
+            </a:fontRef>
+          </p:style>
+        </p:cxnSp>
+      </p:grpSp>
+      <p:grpSp>
+        <p:nvGrpSpPr>
+          <p:cNvPr id="23" name="Group 22">
+            <a:extLst>
+              <a:ext uri="{FF2B5EF4-FFF2-40B4-BE49-F238E27FC236}">
+                <a16:creationId xmlns:a16="http://schemas.microsoft.com/office/drawing/2014/main" id="{538E0876-FFCE-C763-AEB1-A992D62331D7}"/>
+              </a:ext>
+            </a:extLst>
+          </p:cNvPr>
+          <p:cNvGrpSpPr/>
+          <p:nvPr/>
+        </p:nvGrpSpPr>
+        <p:grpSpPr>
+          <a:xfrm>
+            <a:off x="5394011" y="2599102"/>
+            <a:ext cx="296883" cy="753188"/>
+            <a:chOff x="2612343" y="2593731"/>
+            <a:chExt cx="296883" cy="753188"/>
+          </a:xfrm>
+        </p:grpSpPr>
+        <p:sp>
+          <p:nvSpPr>
+            <p:cNvPr id="24" name="Flowchart: Connector 23">
+              <a:extLst>
+                <a:ext uri="{FF2B5EF4-FFF2-40B4-BE49-F238E27FC236}">
+                  <a16:creationId xmlns:a16="http://schemas.microsoft.com/office/drawing/2014/main" id="{C564FF1C-CF46-3430-929C-A6557907D31E}"/>
+                </a:ext>
+              </a:extLst>
+            </p:cNvPr>
+            <p:cNvSpPr/>
+            <p:nvPr/>
+          </p:nvSpPr>
+          <p:spPr>
+            <a:xfrm>
+              <a:off x="2612343" y="3081704"/>
+              <a:ext cx="296883" cy="265215"/>
+            </a:xfrm>
+            <a:prstGeom prst="flowChartConnector">
+              <a:avLst/>
+            </a:prstGeom>
+          </p:spPr>
+          <p:style>
+            <a:lnRef idx="2">
+              <a:schemeClr val="accent1">
+                <a:shade val="15000"/>
+              </a:schemeClr>
+            </a:lnRef>
+            <a:fillRef idx="1">
+              <a:schemeClr val="accent1"/>
+            </a:fillRef>
+            <a:effectRef idx="0">
+              <a:schemeClr val="accent1"/>
+            </a:effectRef>
+            <a:fontRef idx="minor">
+              <a:schemeClr val="lt1"/>
+            </a:fontRef>
+          </p:style>
+          <p:txBody>
+            <a:bodyPr rtlCol="0" anchor="ctr"/>
+            <a:lstStyle/>
+            <a:p>
+              <a:pPr algn="ctr"/>
+              <a:r>
+                <a:rPr lang="en-GB" dirty="0"/>
+                <a:t>3</a:t>
+              </a:r>
+            </a:p>
+          </p:txBody>
+        </p:sp>
+        <p:cxnSp>
+          <p:nvCxnSpPr>
+            <p:cNvPr id="25" name="Straight Arrow Connector 24">
+              <a:extLst>
+                <a:ext uri="{FF2B5EF4-FFF2-40B4-BE49-F238E27FC236}">
+                  <a16:creationId xmlns:a16="http://schemas.microsoft.com/office/drawing/2014/main" id="{219B1066-064A-8A94-DE7D-2D6BE23D0909}"/>
+                </a:ext>
+              </a:extLst>
+            </p:cNvPr>
+            <p:cNvCxnSpPr>
+              <a:cxnSpLocks/>
+              <a:endCxn id="24" idx="0"/>
+            </p:cNvCxnSpPr>
+            <p:nvPr/>
+          </p:nvCxnSpPr>
+          <p:spPr>
+            <a:xfrm flipH="1">
+              <a:off x="2760785" y="2593731"/>
+              <a:ext cx="148441" cy="487973"/>
+            </a:xfrm>
+            <a:prstGeom prst="straightConnector1">
+              <a:avLst/>
+            </a:prstGeom>
+            <a:ln w="19050">
+              <a:solidFill>
+                <a:srgbClr val="FF0000"/>
+              </a:solidFill>
+              <a:tailEnd type="triangle"/>
+            </a:ln>
+          </p:spPr>
+          <p:style>
+            <a:lnRef idx="1">
+              <a:schemeClr val="accent1"/>
+            </a:lnRef>
+            <a:fillRef idx="0">
+              <a:schemeClr val="accent1"/>
+            </a:fillRef>
+            <a:effectRef idx="0">
+              <a:schemeClr val="accent1"/>
+            </a:effectRef>
+            <a:fontRef idx="minor">
+              <a:schemeClr val="tx1"/>
+            </a:fontRef>
+          </p:style>
+        </p:cxnSp>
+      </p:grpSp>
+      <p:grpSp>
+        <p:nvGrpSpPr>
+          <p:cNvPr id="26" name="Group 25">
+            <a:extLst>
+              <a:ext uri="{FF2B5EF4-FFF2-40B4-BE49-F238E27FC236}">
+                <a16:creationId xmlns:a16="http://schemas.microsoft.com/office/drawing/2014/main" id="{8AA4B46E-3F16-FF94-4A93-3E3243410C8A}"/>
+              </a:ext>
+            </a:extLst>
+          </p:cNvPr>
+          <p:cNvGrpSpPr/>
+          <p:nvPr/>
+        </p:nvGrpSpPr>
+        <p:grpSpPr>
+          <a:xfrm>
+            <a:off x="6550199" y="2593731"/>
+            <a:ext cx="296883" cy="753188"/>
+            <a:chOff x="2612343" y="2593731"/>
+            <a:chExt cx="296883" cy="753188"/>
+          </a:xfrm>
+        </p:grpSpPr>
+        <p:sp>
+          <p:nvSpPr>
+            <p:cNvPr id="27" name="Flowchart: Connector 26">
+              <a:extLst>
+                <a:ext uri="{FF2B5EF4-FFF2-40B4-BE49-F238E27FC236}">
+                  <a16:creationId xmlns:a16="http://schemas.microsoft.com/office/drawing/2014/main" id="{224B2AAC-DFD7-8732-7C39-19B36999E003}"/>
+                </a:ext>
+              </a:extLst>
+            </p:cNvPr>
+            <p:cNvSpPr/>
+            <p:nvPr/>
+          </p:nvSpPr>
+          <p:spPr>
+            <a:xfrm>
+              <a:off x="2612343" y="3081704"/>
+              <a:ext cx="296883" cy="265215"/>
+            </a:xfrm>
+            <a:prstGeom prst="flowChartConnector">
+              <a:avLst/>
+            </a:prstGeom>
+          </p:spPr>
+          <p:style>
+            <a:lnRef idx="2">
+              <a:schemeClr val="accent1">
+                <a:shade val="15000"/>
+              </a:schemeClr>
+            </a:lnRef>
+            <a:fillRef idx="1">
+              <a:schemeClr val="accent1"/>
+            </a:fillRef>
+            <a:effectRef idx="0">
+              <a:schemeClr val="accent1"/>
+            </a:effectRef>
+            <a:fontRef idx="minor">
+              <a:schemeClr val="lt1"/>
+            </a:fontRef>
+          </p:style>
+          <p:txBody>
+            <a:bodyPr rtlCol="0" anchor="ctr"/>
+            <a:lstStyle/>
+            <a:p>
+              <a:pPr algn="ctr"/>
+              <a:r>
+                <a:rPr lang="en-GB" dirty="0"/>
+                <a:t>4</a:t>
+              </a:r>
+            </a:p>
+          </p:txBody>
+        </p:sp>
+        <p:cxnSp>
+          <p:nvCxnSpPr>
+            <p:cNvPr id="28" name="Straight Arrow Connector 27">
+              <a:extLst>
+                <a:ext uri="{FF2B5EF4-FFF2-40B4-BE49-F238E27FC236}">
+                  <a16:creationId xmlns:a16="http://schemas.microsoft.com/office/drawing/2014/main" id="{856D8CEA-7813-12B4-306E-E42F343F26FC}"/>
+                </a:ext>
+              </a:extLst>
+            </p:cNvPr>
+            <p:cNvCxnSpPr>
+              <a:cxnSpLocks/>
+              <a:endCxn id="27" idx="0"/>
+            </p:cNvCxnSpPr>
+            <p:nvPr/>
+          </p:nvCxnSpPr>
+          <p:spPr>
+            <a:xfrm flipH="1">
+              <a:off x="2760785" y="2593731"/>
+              <a:ext cx="148441" cy="487973"/>
+            </a:xfrm>
+            <a:prstGeom prst="straightConnector1">
+              <a:avLst/>
+            </a:prstGeom>
+            <a:ln w="19050">
+              <a:solidFill>
+                <a:srgbClr val="FF0000"/>
+              </a:solidFill>
+              <a:tailEnd type="triangle"/>
+            </a:ln>
+          </p:spPr>
+          <p:style>
+            <a:lnRef idx="1">
+              <a:schemeClr val="accent1"/>
+            </a:lnRef>
+            <a:fillRef idx="0">
+              <a:schemeClr val="accent1"/>
+            </a:fillRef>
+            <a:effectRef idx="0">
+              <a:schemeClr val="accent1"/>
+            </a:effectRef>
+            <a:fontRef idx="minor">
+              <a:schemeClr val="tx1"/>
+            </a:fontRef>
+          </p:style>
+        </p:cxnSp>
+      </p:grpSp>
+      <p:grpSp>
+        <p:nvGrpSpPr>
+          <p:cNvPr id="29" name="Group 28">
+            <a:extLst>
+              <a:ext uri="{FF2B5EF4-FFF2-40B4-BE49-F238E27FC236}">
+                <a16:creationId xmlns:a16="http://schemas.microsoft.com/office/drawing/2014/main" id="{E1D34520-2ECE-E2E2-97E2-E3A0B0F81B19}"/>
+              </a:ext>
+            </a:extLst>
+          </p:cNvPr>
+          <p:cNvGrpSpPr/>
+          <p:nvPr/>
+        </p:nvGrpSpPr>
+        <p:grpSpPr>
+          <a:xfrm>
+            <a:off x="7695254" y="2593731"/>
+            <a:ext cx="296883" cy="753188"/>
+            <a:chOff x="2612343" y="2593731"/>
+            <a:chExt cx="296883" cy="753188"/>
+          </a:xfrm>
+        </p:grpSpPr>
+        <p:sp>
+          <p:nvSpPr>
+            <p:cNvPr id="30" name="Flowchart: Connector 29">
+              <a:extLst>
+                <a:ext uri="{FF2B5EF4-FFF2-40B4-BE49-F238E27FC236}">
+                  <a16:creationId xmlns:a16="http://schemas.microsoft.com/office/drawing/2014/main" id="{92A54DE8-43AF-D894-C15A-EF471316C37D}"/>
+                </a:ext>
+              </a:extLst>
+            </p:cNvPr>
+            <p:cNvSpPr/>
+            <p:nvPr/>
+          </p:nvSpPr>
+          <p:spPr>
+            <a:xfrm>
+              <a:off x="2612343" y="3081704"/>
+              <a:ext cx="296883" cy="265215"/>
+            </a:xfrm>
+            <a:prstGeom prst="flowChartConnector">
+              <a:avLst/>
+            </a:prstGeom>
+          </p:spPr>
+          <p:style>
+            <a:lnRef idx="2">
+              <a:schemeClr val="accent1">
+                <a:shade val="15000"/>
+              </a:schemeClr>
+            </a:lnRef>
+            <a:fillRef idx="1">
+              <a:schemeClr val="accent1"/>
+            </a:fillRef>
+            <a:effectRef idx="0">
+              <a:schemeClr val="accent1"/>
+            </a:effectRef>
+            <a:fontRef idx="minor">
+              <a:schemeClr val="lt1"/>
+            </a:fontRef>
+          </p:style>
+          <p:txBody>
+            <a:bodyPr rtlCol="0" anchor="ctr"/>
+            <a:lstStyle/>
+            <a:p>
+              <a:pPr algn="ctr"/>
+              <a:r>
+                <a:rPr lang="en-GB" dirty="0"/>
+                <a:t>5</a:t>
+              </a:r>
+            </a:p>
+          </p:txBody>
+        </p:sp>
+        <p:cxnSp>
+          <p:nvCxnSpPr>
+            <p:cNvPr id="31" name="Straight Arrow Connector 30">
+              <a:extLst>
+                <a:ext uri="{FF2B5EF4-FFF2-40B4-BE49-F238E27FC236}">
+                  <a16:creationId xmlns:a16="http://schemas.microsoft.com/office/drawing/2014/main" id="{47277C8C-D118-04EA-52B1-285F2EF03C23}"/>
+                </a:ext>
+              </a:extLst>
+            </p:cNvPr>
+            <p:cNvCxnSpPr>
+              <a:cxnSpLocks/>
+              <a:endCxn id="30" idx="0"/>
+            </p:cNvCxnSpPr>
+            <p:nvPr/>
+          </p:nvCxnSpPr>
+          <p:spPr>
+            <a:xfrm flipH="1">
+              <a:off x="2760785" y="2593731"/>
+              <a:ext cx="148441" cy="487973"/>
+            </a:xfrm>
+            <a:prstGeom prst="straightConnector1">
+              <a:avLst/>
+            </a:prstGeom>
+            <a:ln w="19050">
+              <a:solidFill>
+                <a:srgbClr val="FF0000"/>
+              </a:solidFill>
+              <a:tailEnd type="triangle"/>
+            </a:ln>
+          </p:spPr>
+          <p:style>
+            <a:lnRef idx="1">
+              <a:schemeClr val="accent1"/>
+            </a:lnRef>
+            <a:fillRef idx="0">
+              <a:schemeClr val="accent1"/>
+            </a:fillRef>
+            <a:effectRef idx="0">
+              <a:schemeClr val="accent1"/>
+            </a:effectRef>
+            <a:fontRef idx="minor">
+              <a:schemeClr val="tx1"/>
+            </a:fontRef>
+          </p:style>
+        </p:cxnSp>
+      </p:grpSp>
+      <p:grpSp>
+        <p:nvGrpSpPr>
+          <p:cNvPr id="32" name="Group 31">
+            <a:extLst>
+              <a:ext uri="{FF2B5EF4-FFF2-40B4-BE49-F238E27FC236}">
+                <a16:creationId xmlns:a16="http://schemas.microsoft.com/office/drawing/2014/main" id="{F21ECE9D-0E70-E1DF-174D-A315A5EC253A}"/>
+              </a:ext>
+            </a:extLst>
+          </p:cNvPr>
+          <p:cNvGrpSpPr/>
+          <p:nvPr/>
+        </p:nvGrpSpPr>
+        <p:grpSpPr>
+          <a:xfrm>
+            <a:off x="8851442" y="2593731"/>
+            <a:ext cx="296883" cy="753188"/>
+            <a:chOff x="2612343" y="2593731"/>
+            <a:chExt cx="296883" cy="753188"/>
+          </a:xfrm>
+        </p:grpSpPr>
+        <p:sp>
+          <p:nvSpPr>
+            <p:cNvPr id="33" name="Flowchart: Connector 32">
+              <a:extLst>
+                <a:ext uri="{FF2B5EF4-FFF2-40B4-BE49-F238E27FC236}">
+                  <a16:creationId xmlns:a16="http://schemas.microsoft.com/office/drawing/2014/main" id="{DA58D2CB-949A-0D5B-9F06-1AA4426029EB}"/>
+                </a:ext>
+              </a:extLst>
+            </p:cNvPr>
+            <p:cNvSpPr/>
+            <p:nvPr/>
+          </p:nvSpPr>
+          <p:spPr>
+            <a:xfrm>
+              <a:off x="2612343" y="3081704"/>
+              <a:ext cx="296883" cy="265215"/>
+            </a:xfrm>
+            <a:prstGeom prst="flowChartConnector">
+              <a:avLst/>
+            </a:prstGeom>
+          </p:spPr>
+          <p:style>
+            <a:lnRef idx="2">
+              <a:schemeClr val="accent1">
+                <a:shade val="15000"/>
+              </a:schemeClr>
+            </a:lnRef>
+            <a:fillRef idx="1">
+              <a:schemeClr val="accent1"/>
+            </a:fillRef>
+            <a:effectRef idx="0">
+              <a:schemeClr val="accent1"/>
+            </a:effectRef>
+            <a:fontRef idx="minor">
+              <a:schemeClr val="lt1"/>
+            </a:fontRef>
+          </p:style>
+          <p:txBody>
+            <a:bodyPr rtlCol="0" anchor="ctr"/>
+            <a:lstStyle/>
+            <a:p>
+              <a:pPr algn="ctr"/>
+              <a:r>
+                <a:rPr lang="en-GB" dirty="0"/>
+                <a:t>6</a:t>
+              </a:r>
+            </a:p>
+          </p:txBody>
+        </p:sp>
+        <p:cxnSp>
+          <p:nvCxnSpPr>
+            <p:cNvPr id="34" name="Straight Arrow Connector 33">
+              <a:extLst>
+                <a:ext uri="{FF2B5EF4-FFF2-40B4-BE49-F238E27FC236}">
+                  <a16:creationId xmlns:a16="http://schemas.microsoft.com/office/drawing/2014/main" id="{228B579C-B6FC-CA6D-5F27-8AEB6C32F2FB}"/>
+                </a:ext>
+              </a:extLst>
+            </p:cNvPr>
+            <p:cNvCxnSpPr>
+              <a:cxnSpLocks/>
+              <a:endCxn id="33" idx="0"/>
+            </p:cNvCxnSpPr>
+            <p:nvPr/>
+          </p:nvCxnSpPr>
+          <p:spPr>
+            <a:xfrm flipH="1">
+              <a:off x="2760785" y="2593731"/>
+              <a:ext cx="148441" cy="487973"/>
+            </a:xfrm>
+            <a:prstGeom prst="straightConnector1">
+              <a:avLst/>
+            </a:prstGeom>
+            <a:ln w="19050">
+              <a:solidFill>
+                <a:srgbClr val="FF0000"/>
+              </a:solidFill>
+              <a:tailEnd type="triangle"/>
+            </a:ln>
+          </p:spPr>
+          <p:style>
+            <a:lnRef idx="1">
+              <a:schemeClr val="accent1"/>
+            </a:lnRef>
+            <a:fillRef idx="0">
+              <a:schemeClr val="accent1"/>
+            </a:fillRef>
+            <a:effectRef idx="0">
+              <a:schemeClr val="accent1"/>
+            </a:effectRef>
+            <a:fontRef idx="minor">
+              <a:schemeClr val="tx1"/>
+            </a:fontRef>
+          </p:style>
+        </p:cxnSp>
+      </p:grpSp>
+    </p:spTree>
+    <p:extLst>
+      <p:ext uri="{BB962C8B-B14F-4D97-AF65-F5344CB8AC3E}">
+        <p14:creationId xmlns:p14="http://schemas.microsoft.com/office/powerpoint/2010/main" val="110174190"/>
+      </p:ext>
+    </p:extLst>
+  </p:cSld>
+  <p:clrMapOvr>
+    <a:masterClrMapping/>
+  </p:clrMapOvr>
+</p:sld>
+</file>
+
+<file path=ppt/slides/slide4.xml><?xml version="1.0" encoding="utf-8"?>
+<p:sld xmlns:a="http://schemas.openxmlformats.org/drawingml/2006/main" xmlns:r="http://schemas.openxmlformats.org/officeDocument/2006/relationships" xmlns:p="http://schemas.openxmlformats.org/presentationml/2006/main">
+  <p:cSld>
+    <p:spTree>
+      <p:nvGrpSpPr>
+        <p:cNvPr id="1" name=""/>
+        <p:cNvGrpSpPr/>
+        <p:nvPr/>
+      </p:nvGrpSpPr>
+      <p:grpSpPr>
+        <a:xfrm>
+          <a:off x="0" y="0"/>
+          <a:ext cx="0" cy="0"/>
+          <a:chOff x="0" y="0"/>
+          <a:chExt cx="0" cy="0"/>
+        </a:xfrm>
+      </p:grpSpPr>
+      <p:pic>
+        <p:nvPicPr>
+          <p:cNvPr id="3" name="Picture 2">
+            <a:extLst>
+              <a:ext uri="{FF2B5EF4-FFF2-40B4-BE49-F238E27FC236}">
+                <a16:creationId xmlns:a16="http://schemas.microsoft.com/office/drawing/2014/main" id="{F23058A7-3BA7-F75F-1952-1F6C92DCB418}"/>
+              </a:ext>
+            </a:extLst>
+          </p:cNvPr>
+          <p:cNvPicPr>
+            <a:picLocks noChangeAspect="1"/>
+          </p:cNvPicPr>
+          <p:nvPr/>
+        </p:nvPicPr>
+        <p:blipFill>
+          <a:blip r:embed="rId2"/>
+          <a:stretch>
+            <a:fillRect/>
+          </a:stretch>
+        </p:blipFill>
+        <p:spPr>
+          <a:xfrm>
+            <a:off x="1480417" y="551605"/>
+            <a:ext cx="4254719" cy="4400776"/>
+          </a:xfrm>
+          <a:prstGeom prst="rect">
+            <a:avLst/>
+          </a:prstGeom>
+        </p:spPr>
+      </p:pic>
+      <p:grpSp>
+        <p:nvGrpSpPr>
+          <p:cNvPr id="4" name="Group 3">
+            <a:extLst>
+              <a:ext uri="{FF2B5EF4-FFF2-40B4-BE49-F238E27FC236}">
+                <a16:creationId xmlns:a16="http://schemas.microsoft.com/office/drawing/2014/main" id="{1C85B07A-E4E3-4034-63C9-412BE9FB6BD4}"/>
+              </a:ext>
+            </a:extLst>
+          </p:cNvPr>
+          <p:cNvGrpSpPr/>
+          <p:nvPr/>
+        </p:nvGrpSpPr>
+        <p:grpSpPr>
+          <a:xfrm>
+            <a:off x="5210313" y="967915"/>
+            <a:ext cx="1049645" cy="265215"/>
+            <a:chOff x="4568474" y="1350380"/>
+            <a:chExt cx="1049645" cy="265215"/>
+          </a:xfrm>
+        </p:grpSpPr>
+        <p:sp>
+          <p:nvSpPr>
+            <p:cNvPr id="5" name="Flowchart: Connector 4">
+              <a:extLst>
+                <a:ext uri="{FF2B5EF4-FFF2-40B4-BE49-F238E27FC236}">
+                  <a16:creationId xmlns:a16="http://schemas.microsoft.com/office/drawing/2014/main" id="{AE6A6E46-BD79-9479-1DBF-CE96E413C407}"/>
+                </a:ext>
+              </a:extLst>
+            </p:cNvPr>
+            <p:cNvSpPr/>
+            <p:nvPr/>
+          </p:nvSpPr>
+          <p:spPr>
+            <a:xfrm>
+              <a:off x="5321236" y="1350380"/>
+              <a:ext cx="296883" cy="265215"/>
+            </a:xfrm>
+            <a:prstGeom prst="flowChartConnector">
+              <a:avLst/>
+            </a:prstGeom>
+          </p:spPr>
+          <p:style>
+            <a:lnRef idx="2">
+              <a:schemeClr val="accent1">
+                <a:shade val="15000"/>
+              </a:schemeClr>
+            </a:lnRef>
+            <a:fillRef idx="1">
+              <a:schemeClr val="accent1"/>
+            </a:fillRef>
+            <a:effectRef idx="0">
+              <a:schemeClr val="accent1"/>
+            </a:effectRef>
+            <a:fontRef idx="minor">
+              <a:schemeClr val="lt1"/>
+            </a:fontRef>
+          </p:style>
+          <p:txBody>
+            <a:bodyPr rtlCol="0" anchor="ctr"/>
+            <a:lstStyle/>
+            <a:p>
+              <a:pPr algn="ctr"/>
+              <a:r>
+                <a:rPr lang="en-GB" dirty="0"/>
+                <a:t>1</a:t>
+              </a:r>
+            </a:p>
+          </p:txBody>
+        </p:sp>
+        <p:cxnSp>
+          <p:nvCxnSpPr>
+            <p:cNvPr id="6" name="Straight Arrow Connector 5">
+              <a:extLst>
+                <a:ext uri="{FF2B5EF4-FFF2-40B4-BE49-F238E27FC236}">
+                  <a16:creationId xmlns:a16="http://schemas.microsoft.com/office/drawing/2014/main" id="{EAC2A124-703F-37B1-6597-3AFDD6C98678}"/>
+                </a:ext>
+              </a:extLst>
+            </p:cNvPr>
+            <p:cNvCxnSpPr>
+              <a:cxnSpLocks/>
+              <a:endCxn id="5" idx="2"/>
+            </p:cNvCxnSpPr>
+            <p:nvPr/>
+          </p:nvCxnSpPr>
+          <p:spPr>
+            <a:xfrm flipV="1">
+              <a:off x="4568474" y="1482988"/>
+              <a:ext cx="752762" cy="67294"/>
+            </a:xfrm>
+            <a:prstGeom prst="straightConnector1">
+              <a:avLst/>
+            </a:prstGeom>
+            <a:ln w="19050">
+              <a:tailEnd type="triangle"/>
+            </a:ln>
+          </p:spPr>
+          <p:style>
+            <a:lnRef idx="1">
+              <a:schemeClr val="accent1"/>
+            </a:lnRef>
+            <a:fillRef idx="0">
+              <a:schemeClr val="accent1"/>
+            </a:fillRef>
+            <a:effectRef idx="0">
+              <a:schemeClr val="accent1"/>
+            </a:effectRef>
+            <a:fontRef idx="minor">
+              <a:schemeClr val="tx1"/>
+            </a:fontRef>
+          </p:style>
+        </p:cxnSp>
+      </p:grpSp>
+      <p:grpSp>
+        <p:nvGrpSpPr>
+          <p:cNvPr id="7" name="Group 6">
+            <a:extLst>
+              <a:ext uri="{FF2B5EF4-FFF2-40B4-BE49-F238E27FC236}">
+                <a16:creationId xmlns:a16="http://schemas.microsoft.com/office/drawing/2014/main" id="{C54E911F-B3C0-6F4C-A4C3-76B958177646}"/>
+              </a:ext>
+            </a:extLst>
+          </p:cNvPr>
+          <p:cNvGrpSpPr/>
+          <p:nvPr/>
+        </p:nvGrpSpPr>
+        <p:grpSpPr>
+          <a:xfrm>
+            <a:off x="5210313" y="1782047"/>
+            <a:ext cx="1049645" cy="265215"/>
+            <a:chOff x="4979059" y="1329244"/>
+            <a:chExt cx="1049645" cy="265215"/>
+          </a:xfrm>
+        </p:grpSpPr>
+        <p:sp>
+          <p:nvSpPr>
+            <p:cNvPr id="8" name="Flowchart: Connector 7">
+              <a:extLst>
+                <a:ext uri="{FF2B5EF4-FFF2-40B4-BE49-F238E27FC236}">
+                  <a16:creationId xmlns:a16="http://schemas.microsoft.com/office/drawing/2014/main" id="{BB42142B-BA50-4EAB-4FF6-8CE0C78CD5C2}"/>
+                </a:ext>
+              </a:extLst>
+            </p:cNvPr>
+            <p:cNvSpPr/>
+            <p:nvPr/>
+          </p:nvSpPr>
+          <p:spPr>
+            <a:xfrm>
+              <a:off x="5731821" y="1329244"/>
+              <a:ext cx="296883" cy="265215"/>
+            </a:xfrm>
+            <a:prstGeom prst="flowChartConnector">
+              <a:avLst/>
+            </a:prstGeom>
+          </p:spPr>
+          <p:style>
+            <a:lnRef idx="2">
+              <a:schemeClr val="accent1">
+                <a:shade val="15000"/>
+              </a:schemeClr>
+            </a:lnRef>
+            <a:fillRef idx="1">
+              <a:schemeClr val="accent1"/>
+            </a:fillRef>
+            <a:effectRef idx="0">
+              <a:schemeClr val="accent1"/>
+            </a:effectRef>
+            <a:fontRef idx="minor">
+              <a:schemeClr val="lt1"/>
+            </a:fontRef>
+          </p:style>
+          <p:txBody>
+            <a:bodyPr rtlCol="0" anchor="ctr"/>
+            <a:lstStyle/>
+            <a:p>
+              <a:pPr algn="ctr"/>
+              <a:r>
+                <a:rPr lang="en-GB" dirty="0"/>
+                <a:t>2</a:t>
+              </a:r>
+            </a:p>
+          </p:txBody>
+        </p:sp>
+        <p:cxnSp>
+          <p:nvCxnSpPr>
+            <p:cNvPr id="9" name="Straight Arrow Connector 8">
+              <a:extLst>
+                <a:ext uri="{FF2B5EF4-FFF2-40B4-BE49-F238E27FC236}">
+                  <a16:creationId xmlns:a16="http://schemas.microsoft.com/office/drawing/2014/main" id="{D47FA430-A950-A90A-7E73-48BCCDF22283}"/>
+                </a:ext>
+              </a:extLst>
+            </p:cNvPr>
+            <p:cNvCxnSpPr>
+              <a:cxnSpLocks/>
+              <a:endCxn id="8" idx="2"/>
+            </p:cNvCxnSpPr>
+            <p:nvPr/>
+          </p:nvCxnSpPr>
+          <p:spPr>
+            <a:xfrm flipV="1">
+              <a:off x="4979059" y="1461852"/>
+              <a:ext cx="752762" cy="67294"/>
+            </a:xfrm>
+            <a:prstGeom prst="straightConnector1">
+              <a:avLst/>
+            </a:prstGeom>
+            <a:ln w="19050">
+              <a:tailEnd type="triangle"/>
+            </a:ln>
+          </p:spPr>
+          <p:style>
+            <a:lnRef idx="1">
+              <a:schemeClr val="accent1"/>
+            </a:lnRef>
+            <a:fillRef idx="0">
+              <a:schemeClr val="accent1"/>
+            </a:fillRef>
+            <a:effectRef idx="0">
+              <a:schemeClr val="accent1"/>
+            </a:effectRef>
+            <a:fontRef idx="minor">
+              <a:schemeClr val="tx1"/>
+            </a:fontRef>
+          </p:style>
+        </p:cxnSp>
+      </p:grpSp>
+      <p:grpSp>
+        <p:nvGrpSpPr>
+          <p:cNvPr id="10" name="Group 9">
+            <a:extLst>
+              <a:ext uri="{FF2B5EF4-FFF2-40B4-BE49-F238E27FC236}">
+                <a16:creationId xmlns:a16="http://schemas.microsoft.com/office/drawing/2014/main" id="{323BAFB8-3D6B-076D-1C9C-7E1CEB84ACC9}"/>
+              </a:ext>
+            </a:extLst>
+          </p:cNvPr>
+          <p:cNvGrpSpPr/>
+          <p:nvPr/>
+        </p:nvGrpSpPr>
+        <p:grpSpPr>
+          <a:xfrm>
+            <a:off x="2765181" y="3407826"/>
+            <a:ext cx="3494777" cy="337697"/>
+            <a:chOff x="2533927" y="1329244"/>
+            <a:chExt cx="3494777" cy="337697"/>
+          </a:xfrm>
+        </p:grpSpPr>
+        <p:sp>
+          <p:nvSpPr>
+            <p:cNvPr id="11" name="Flowchart: Connector 10">
+              <a:extLst>
+                <a:ext uri="{FF2B5EF4-FFF2-40B4-BE49-F238E27FC236}">
+                  <a16:creationId xmlns:a16="http://schemas.microsoft.com/office/drawing/2014/main" id="{643DBF59-61B8-1713-AB08-4DB579FFA0BE}"/>
+                </a:ext>
+              </a:extLst>
+            </p:cNvPr>
+            <p:cNvSpPr/>
+            <p:nvPr/>
+          </p:nvSpPr>
+          <p:spPr>
+            <a:xfrm>
+              <a:off x="5731821" y="1329244"/>
+              <a:ext cx="296883" cy="265215"/>
+            </a:xfrm>
+            <a:prstGeom prst="flowChartConnector">
+              <a:avLst/>
+            </a:prstGeom>
+          </p:spPr>
+          <p:style>
+            <a:lnRef idx="2">
+              <a:schemeClr val="accent1">
+                <a:shade val="15000"/>
+              </a:schemeClr>
+            </a:lnRef>
+            <a:fillRef idx="1">
+              <a:schemeClr val="accent1"/>
+            </a:fillRef>
+            <a:effectRef idx="0">
+              <a:schemeClr val="accent1"/>
+            </a:effectRef>
+            <a:fontRef idx="minor">
+              <a:schemeClr val="lt1"/>
+            </a:fontRef>
+          </p:style>
+          <p:txBody>
+            <a:bodyPr rtlCol="0" anchor="ctr"/>
+            <a:lstStyle/>
+            <a:p>
+              <a:pPr algn="ctr"/>
+              <a:r>
+                <a:rPr lang="en-GB" dirty="0"/>
+                <a:t>3</a:t>
+              </a:r>
+            </a:p>
+          </p:txBody>
+        </p:sp>
+        <p:cxnSp>
+          <p:nvCxnSpPr>
+            <p:cNvPr id="12" name="Straight Arrow Connector 11">
+              <a:extLst>
+                <a:ext uri="{FF2B5EF4-FFF2-40B4-BE49-F238E27FC236}">
+                  <a16:creationId xmlns:a16="http://schemas.microsoft.com/office/drawing/2014/main" id="{492BAC44-E5BB-2A3A-8E3B-202113690AA3}"/>
+                </a:ext>
+              </a:extLst>
+            </p:cNvPr>
+            <p:cNvCxnSpPr>
+              <a:cxnSpLocks/>
+              <a:endCxn id="11" idx="2"/>
+            </p:cNvCxnSpPr>
+            <p:nvPr/>
+          </p:nvCxnSpPr>
+          <p:spPr>
+            <a:xfrm flipV="1">
+              <a:off x="2533927" y="1461852"/>
+              <a:ext cx="3197894" cy="205089"/>
+            </a:xfrm>
+            <a:prstGeom prst="straightConnector1">
+              <a:avLst/>
+            </a:prstGeom>
+            <a:ln w="19050">
+              <a:tailEnd type="triangle"/>
+            </a:ln>
+          </p:spPr>
+          <p:style>
+            <a:lnRef idx="1">
+              <a:schemeClr val="accent1"/>
+            </a:lnRef>
+            <a:fillRef idx="0">
+              <a:schemeClr val="accent1"/>
+            </a:fillRef>
+            <a:effectRef idx="0">
+              <a:schemeClr val="accent1"/>
+            </a:effectRef>
+            <a:fontRef idx="minor">
+              <a:schemeClr val="tx1"/>
+            </a:fontRef>
+          </p:style>
+        </p:cxnSp>
+      </p:grpSp>
+      <p:grpSp>
+        <p:nvGrpSpPr>
+          <p:cNvPr id="14" name="Group 13">
+            <a:extLst>
+              <a:ext uri="{FF2B5EF4-FFF2-40B4-BE49-F238E27FC236}">
+                <a16:creationId xmlns:a16="http://schemas.microsoft.com/office/drawing/2014/main" id="{82B00A15-F0EE-4EBE-C9E6-392C05B836E9}"/>
+              </a:ext>
+            </a:extLst>
+          </p:cNvPr>
+          <p:cNvGrpSpPr/>
+          <p:nvPr/>
+        </p:nvGrpSpPr>
+        <p:grpSpPr>
+          <a:xfrm>
+            <a:off x="2765181" y="4287271"/>
+            <a:ext cx="3494777" cy="438594"/>
+            <a:chOff x="2533927" y="1329244"/>
+            <a:chExt cx="3494777" cy="438594"/>
+          </a:xfrm>
+        </p:grpSpPr>
+        <p:sp>
+          <p:nvSpPr>
+            <p:cNvPr id="15" name="Flowchart: Connector 14">
+              <a:extLst>
+                <a:ext uri="{FF2B5EF4-FFF2-40B4-BE49-F238E27FC236}">
+                  <a16:creationId xmlns:a16="http://schemas.microsoft.com/office/drawing/2014/main" id="{057B8D22-C002-ACC4-7917-F1575F86E70A}"/>
+                </a:ext>
+              </a:extLst>
+            </p:cNvPr>
+            <p:cNvSpPr/>
+            <p:nvPr/>
+          </p:nvSpPr>
+          <p:spPr>
+            <a:xfrm>
+              <a:off x="5731821" y="1329244"/>
+              <a:ext cx="296883" cy="265215"/>
+            </a:xfrm>
+            <a:prstGeom prst="flowChartConnector">
+              <a:avLst/>
+            </a:prstGeom>
+          </p:spPr>
+          <p:style>
+            <a:lnRef idx="2">
+              <a:schemeClr val="accent1">
+                <a:shade val="15000"/>
+              </a:schemeClr>
+            </a:lnRef>
+            <a:fillRef idx="1">
+              <a:schemeClr val="accent1"/>
+            </a:fillRef>
+            <a:effectRef idx="0">
+              <a:schemeClr val="accent1"/>
+            </a:effectRef>
+            <a:fontRef idx="minor">
+              <a:schemeClr val="lt1"/>
+            </a:fontRef>
+          </p:style>
+          <p:txBody>
+            <a:bodyPr rtlCol="0" anchor="ctr"/>
+            <a:lstStyle/>
+            <a:p>
+              <a:pPr algn="ctr"/>
+              <a:r>
+                <a:rPr lang="en-GB" dirty="0"/>
+                <a:t>4</a:t>
+              </a:r>
+            </a:p>
+          </p:txBody>
+        </p:sp>
+        <p:cxnSp>
+          <p:nvCxnSpPr>
+            <p:cNvPr id="16" name="Straight Arrow Connector 15">
+              <a:extLst>
+                <a:ext uri="{FF2B5EF4-FFF2-40B4-BE49-F238E27FC236}">
+                  <a16:creationId xmlns:a16="http://schemas.microsoft.com/office/drawing/2014/main" id="{519DC765-0AF2-B8D5-2240-30A1EFB17A5B}"/>
+                </a:ext>
+              </a:extLst>
+            </p:cNvPr>
+            <p:cNvCxnSpPr>
+              <a:cxnSpLocks/>
+              <a:endCxn id="15" idx="2"/>
+            </p:cNvCxnSpPr>
+            <p:nvPr/>
+          </p:nvCxnSpPr>
+          <p:spPr>
+            <a:xfrm flipV="1">
+              <a:off x="2533927" y="1461852"/>
+              <a:ext cx="3197894" cy="305986"/>
+            </a:xfrm>
+            <a:prstGeom prst="straightConnector1">
+              <a:avLst/>
+            </a:prstGeom>
+            <a:ln w="19050">
+              <a:tailEnd type="triangle"/>
+            </a:ln>
+          </p:spPr>
+          <p:style>
+            <a:lnRef idx="1">
+              <a:schemeClr val="accent1"/>
+            </a:lnRef>
+            <a:fillRef idx="0">
+              <a:schemeClr val="accent1"/>
+            </a:fillRef>
+            <a:effectRef idx="0">
+              <a:schemeClr val="accent1"/>
+            </a:effectRef>
+            <a:fontRef idx="minor">
+              <a:schemeClr val="tx1"/>
+            </a:fontRef>
+          </p:style>
+        </p:cxnSp>
+      </p:grpSp>
+    </p:spTree>
+    <p:extLst>
+      <p:ext uri="{BB962C8B-B14F-4D97-AF65-F5344CB8AC3E}">
+        <p14:creationId xmlns:p14="http://schemas.microsoft.com/office/powerpoint/2010/main" val="1227989790"/>
+      </p:ext>
+    </p:extLst>
+  </p:cSld>
+  <p:clrMapOvr>
+    <a:masterClrMapping/>
+  </p:clrMapOvr>
+</p:sld>
+</file>
+
+<file path=ppt/slides/slide5.xml><?xml version="1.0" encoding="utf-8"?>
+<p:sld xmlns:a="http://schemas.openxmlformats.org/drawingml/2006/main" xmlns:r="http://schemas.openxmlformats.org/officeDocument/2006/relationships" xmlns:p="http://schemas.openxmlformats.org/presentationml/2006/main">
+  <p:cSld>
+    <p:spTree>
+      <p:nvGrpSpPr>
+        <p:cNvPr id="1" name=""/>
+        <p:cNvGrpSpPr/>
+        <p:nvPr/>
+      </p:nvGrpSpPr>
+      <p:grpSpPr>
+        <a:xfrm>
+          <a:off x="0" y="0"/>
+          <a:ext cx="0" cy="0"/>
+          <a:chOff x="0" y="0"/>
+          <a:chExt cx="0" cy="0"/>
+        </a:xfrm>
+      </p:grpSpPr>
+      <p:pic>
+        <p:nvPicPr>
+          <p:cNvPr id="3" name="Picture 2">
+            <a:extLst>
+              <a:ext uri="{FF2B5EF4-FFF2-40B4-BE49-F238E27FC236}">
                 <a16:creationId xmlns:a16="http://schemas.microsoft.com/office/drawing/2014/main" id="{BEFED922-5DBD-00B1-FB22-0B6FF1FF3FF3}"/>
               </a:ext>
             </a:extLst>
@@ -4006,10 +5296,10 @@
       </p:pic>
       <p:sp>
         <p:nvSpPr>
-          <p:cNvPr id="10" name="Flowchart: Connector 9">
-            <a:extLst>
-              <a:ext uri="{FF2B5EF4-FFF2-40B4-BE49-F238E27FC236}">
-                <a16:creationId xmlns:a16="http://schemas.microsoft.com/office/drawing/2014/main" id="{5CF6DAF0-3FA4-5296-2E98-90113F04339E}"/>
+          <p:cNvPr id="11" name="Flowchart: Connector 10">
+            <a:extLst>
+              <a:ext uri="{FF2B5EF4-FFF2-40B4-BE49-F238E27FC236}">
+                <a16:creationId xmlns:a16="http://schemas.microsoft.com/office/drawing/2014/main" id="{7D52960C-093F-496B-C72B-630D6AE42656}"/>
               </a:ext>
             </a:extLst>
           </p:cNvPr>
@@ -4018,7 +5308,7 @@
         </p:nvSpPr>
         <p:spPr>
           <a:xfrm>
-            <a:off x="5731821" y="1329244"/>
+            <a:off x="5735777" y="2202871"/>
             <a:ext cx="296883" cy="265215"/>
           </a:xfrm>
           <a:prstGeom prst="flowChartConnector">
@@ -4048,17 +5338,17 @@
             <a:pPr algn="ctr"/>
             <a:r>
               <a:rPr lang="en-GB" dirty="0"/>
-              <a:t>1</a:t>
-            </a:r>
-          </a:p>
-        </p:txBody>
-      </p:sp>
-      <p:sp>
-        <p:nvSpPr>
-          <p:cNvPr id="11" name="Flowchart: Connector 10">
-            <a:extLst>
-              <a:ext uri="{FF2B5EF4-FFF2-40B4-BE49-F238E27FC236}">
-                <a16:creationId xmlns:a16="http://schemas.microsoft.com/office/drawing/2014/main" id="{7D52960C-093F-496B-C72B-630D6AE42656}"/>
+              <a:t>2</a:t>
+            </a:r>
+          </a:p>
+        </p:txBody>
+      </p:sp>
+      <p:sp>
+        <p:nvSpPr>
+          <p:cNvPr id="12" name="Flowchart: Connector 11">
+            <a:extLst>
+              <a:ext uri="{FF2B5EF4-FFF2-40B4-BE49-F238E27FC236}">
+                <a16:creationId xmlns:a16="http://schemas.microsoft.com/office/drawing/2014/main" id="{F5ECA04B-5F4A-C6E1-642A-07EC9CD2CD63}"/>
               </a:ext>
             </a:extLst>
           </p:cNvPr>
@@ -4067,7 +5357,7 @@
         </p:nvSpPr>
         <p:spPr>
           <a:xfrm>
-            <a:off x="5735777" y="2202871"/>
+            <a:off x="5731820" y="3099848"/>
             <a:ext cx="296883" cy="265215"/>
           </a:xfrm>
           <a:prstGeom prst="flowChartConnector">
@@ -4097,17 +5387,17 @@
             <a:pPr algn="ctr"/>
             <a:r>
               <a:rPr lang="en-GB" dirty="0"/>
-              <a:t>2</a:t>
-            </a:r>
-          </a:p>
-        </p:txBody>
-      </p:sp>
-      <p:sp>
-        <p:nvSpPr>
-          <p:cNvPr id="12" name="Flowchart: Connector 11">
-            <a:extLst>
-              <a:ext uri="{FF2B5EF4-FFF2-40B4-BE49-F238E27FC236}">
-                <a16:creationId xmlns:a16="http://schemas.microsoft.com/office/drawing/2014/main" id="{F5ECA04B-5F4A-C6E1-642A-07EC9CD2CD63}"/>
+              <a:t>3</a:t>
+            </a:r>
+          </a:p>
+        </p:txBody>
+      </p:sp>
+      <p:sp>
+        <p:nvSpPr>
+          <p:cNvPr id="13" name="Flowchart: Connector 12">
+            <a:extLst>
+              <a:ext uri="{FF2B5EF4-FFF2-40B4-BE49-F238E27FC236}">
+                <a16:creationId xmlns:a16="http://schemas.microsoft.com/office/drawing/2014/main" id="{6D0235F8-473F-F816-A164-6A7EDAD94DAE}"/>
               </a:ext>
             </a:extLst>
           </p:cNvPr>
@@ -4116,7 +5406,7 @@
         </p:nvSpPr>
         <p:spPr>
           <a:xfrm>
-            <a:off x="5731820" y="3099848"/>
+            <a:off x="1570676" y="3883384"/>
             <a:ext cx="296883" cy="265215"/>
           </a:xfrm>
           <a:prstGeom prst="flowChartConnector">
@@ -4146,17 +5436,17 @@
             <a:pPr algn="ctr"/>
             <a:r>
               <a:rPr lang="en-GB" dirty="0"/>
-              <a:t>3</a:t>
-            </a:r>
-          </a:p>
-        </p:txBody>
-      </p:sp>
-      <p:sp>
-        <p:nvSpPr>
-          <p:cNvPr id="13" name="Flowchart: Connector 12">
-            <a:extLst>
-              <a:ext uri="{FF2B5EF4-FFF2-40B4-BE49-F238E27FC236}">
-                <a16:creationId xmlns:a16="http://schemas.microsoft.com/office/drawing/2014/main" id="{6D0235F8-473F-F816-A164-6A7EDAD94DAE}"/>
+              <a:t>1</a:t>
+            </a:r>
+          </a:p>
+        </p:txBody>
+      </p:sp>
+      <p:sp>
+        <p:nvSpPr>
+          <p:cNvPr id="14" name="Flowchart: Connector 13">
+            <a:extLst>
+              <a:ext uri="{FF2B5EF4-FFF2-40B4-BE49-F238E27FC236}">
+                <a16:creationId xmlns:a16="http://schemas.microsoft.com/office/drawing/2014/main" id="{A381301B-46F1-17DF-1B05-C3590319A340}"/>
               </a:ext>
             </a:extLst>
           </p:cNvPr>
@@ -4165,7 +5455,7 @@
         </p:nvSpPr>
         <p:spPr>
           <a:xfrm>
-            <a:off x="1570676" y="3883384"/>
+            <a:off x="2931552" y="3883384"/>
             <a:ext cx="296883" cy="265215"/>
           </a:xfrm>
           <a:prstGeom prst="flowChartConnector">
@@ -4195,17 +5485,17 @@
             <a:pPr algn="ctr"/>
             <a:r>
               <a:rPr lang="en-GB" dirty="0"/>
-              <a:t>1</a:t>
-            </a:r>
-          </a:p>
-        </p:txBody>
-      </p:sp>
-      <p:sp>
-        <p:nvSpPr>
-          <p:cNvPr id="14" name="Flowchart: Connector 13">
-            <a:extLst>
-              <a:ext uri="{FF2B5EF4-FFF2-40B4-BE49-F238E27FC236}">
-                <a16:creationId xmlns:a16="http://schemas.microsoft.com/office/drawing/2014/main" id="{A381301B-46F1-17DF-1B05-C3590319A340}"/>
+              <a:t>2</a:t>
+            </a:r>
+          </a:p>
+        </p:txBody>
+      </p:sp>
+      <p:sp>
+        <p:nvSpPr>
+          <p:cNvPr id="15" name="Flowchart: Connector 14">
+            <a:extLst>
+              <a:ext uri="{FF2B5EF4-FFF2-40B4-BE49-F238E27FC236}">
+                <a16:creationId xmlns:a16="http://schemas.microsoft.com/office/drawing/2014/main" id="{7E8C3B72-7BCF-A111-932C-17963DB5E075}"/>
               </a:ext>
             </a:extLst>
           </p:cNvPr>
@@ -4214,7 +5504,7 @@
         </p:nvSpPr>
         <p:spPr>
           <a:xfrm>
-            <a:off x="2931552" y="3883384"/>
+            <a:off x="4538682" y="3883383"/>
             <a:ext cx="296883" cy="265215"/>
           </a:xfrm>
           <a:prstGeom prst="flowChartConnector">
@@ -4244,17 +5534,17 @@
             <a:pPr algn="ctr"/>
             <a:r>
               <a:rPr lang="en-GB" dirty="0"/>
-              <a:t>2</a:t>
-            </a:r>
-          </a:p>
-        </p:txBody>
-      </p:sp>
-      <p:sp>
-        <p:nvSpPr>
-          <p:cNvPr id="15" name="Flowchart: Connector 14">
-            <a:extLst>
-              <a:ext uri="{FF2B5EF4-FFF2-40B4-BE49-F238E27FC236}">
-                <a16:creationId xmlns:a16="http://schemas.microsoft.com/office/drawing/2014/main" id="{7E8C3B72-7BCF-A111-932C-17963DB5E075}"/>
+              <a:t>3</a:t>
+            </a:r>
+          </a:p>
+        </p:txBody>
+      </p:sp>
+      <p:sp>
+        <p:nvSpPr>
+          <p:cNvPr id="16" name="Flowchart: Connector 15">
+            <a:extLst>
+              <a:ext uri="{FF2B5EF4-FFF2-40B4-BE49-F238E27FC236}">
+                <a16:creationId xmlns:a16="http://schemas.microsoft.com/office/drawing/2014/main" id="{725D92AC-6550-C0DD-620D-B3FD1353B7BF}"/>
               </a:ext>
             </a:extLst>
           </p:cNvPr>
@@ -4263,7 +5553,7 @@
         </p:nvSpPr>
         <p:spPr>
           <a:xfrm>
-            <a:off x="4538682" y="3883383"/>
+            <a:off x="5395140" y="5318401"/>
             <a:ext cx="296883" cy="265215"/>
           </a:xfrm>
           <a:prstGeom prst="flowChartConnector">
@@ -4293,17 +5583,17 @@
             <a:pPr algn="ctr"/>
             <a:r>
               <a:rPr lang="en-GB" dirty="0"/>
-              <a:t>3</a:t>
-            </a:r>
-          </a:p>
-        </p:txBody>
-      </p:sp>
-      <p:sp>
-        <p:nvSpPr>
-          <p:cNvPr id="16" name="Flowchart: Connector 15">
-            <a:extLst>
-              <a:ext uri="{FF2B5EF4-FFF2-40B4-BE49-F238E27FC236}">
-                <a16:creationId xmlns:a16="http://schemas.microsoft.com/office/drawing/2014/main" id="{725D92AC-6550-C0DD-620D-B3FD1353B7BF}"/>
+              <a:t>4</a:t>
+            </a:r>
+          </a:p>
+        </p:txBody>
+      </p:sp>
+      <p:sp>
+        <p:nvSpPr>
+          <p:cNvPr id="17" name="Flowchart: Connector 16">
+            <a:extLst>
+              <a:ext uri="{FF2B5EF4-FFF2-40B4-BE49-F238E27FC236}">
+                <a16:creationId xmlns:a16="http://schemas.microsoft.com/office/drawing/2014/main" id="{DD7259E6-FE90-F52D-260A-1CCF774A7AB9}"/>
               </a:ext>
             </a:extLst>
           </p:cNvPr>
@@ -4312,7 +5602,7 @@
         </p:nvSpPr>
         <p:spPr>
           <a:xfrm>
-            <a:off x="5395140" y="5318401"/>
+            <a:off x="10531432" y="2268508"/>
             <a:ext cx="296883" cy="265215"/>
           </a:xfrm>
           <a:prstGeom prst="flowChartConnector">
@@ -4342,102 +5632,123 @@
             <a:pPr algn="ctr"/>
             <a:r>
               <a:rPr lang="en-GB" dirty="0"/>
-              <a:t>4</a:t>
-            </a:r>
-          </a:p>
-        </p:txBody>
-      </p:sp>
-      <p:sp>
-        <p:nvSpPr>
-          <p:cNvPr id="17" name="Flowchart: Connector 16">
-            <a:extLst>
-              <a:ext uri="{FF2B5EF4-FFF2-40B4-BE49-F238E27FC236}">
-                <a16:creationId xmlns:a16="http://schemas.microsoft.com/office/drawing/2014/main" id="{DD7259E6-FE90-F52D-260A-1CCF774A7AB9}"/>
-              </a:ext>
-            </a:extLst>
-          </p:cNvPr>
-          <p:cNvSpPr/>
+              <a:t>1</a:t>
+            </a:r>
+          </a:p>
+        </p:txBody>
+      </p:sp>
+      <p:grpSp>
+        <p:nvGrpSpPr>
+          <p:cNvPr id="42" name="Group 41">
+            <a:extLst>
+              <a:ext uri="{FF2B5EF4-FFF2-40B4-BE49-F238E27FC236}">
+                <a16:creationId xmlns:a16="http://schemas.microsoft.com/office/drawing/2014/main" id="{540CED2C-972C-2B34-5CCD-FE0A883538BE}"/>
+              </a:ext>
+            </a:extLst>
+          </p:cNvPr>
+          <p:cNvGrpSpPr/>
           <p:nvPr/>
-        </p:nvSpPr>
-        <p:spPr>
+        </p:nvGrpSpPr>
+        <p:grpSpPr>
           <a:xfrm>
-            <a:off x="10531432" y="2268508"/>
-            <a:ext cx="296883" cy="265215"/>
-          </a:xfrm>
-          <a:prstGeom prst="flowChartConnector">
-            <a:avLst/>
-          </a:prstGeom>
-        </p:spPr>
-        <p:style>
-          <a:lnRef idx="2">
-            <a:schemeClr val="accent1">
-              <a:shade val="15000"/>
-            </a:schemeClr>
-          </a:lnRef>
-          <a:fillRef idx="1">
-            <a:schemeClr val="accent1"/>
-          </a:fillRef>
-          <a:effectRef idx="0">
-            <a:schemeClr val="accent1"/>
-          </a:effectRef>
-          <a:fontRef idx="minor">
-            <a:schemeClr val="lt1"/>
-          </a:fontRef>
-        </p:style>
-        <p:txBody>
-          <a:bodyPr rtlCol="0" anchor="ctr"/>
-          <a:lstStyle/>
-          <a:p>
-            <a:pPr algn="ctr"/>
-            <a:r>
-              <a:rPr lang="en-GB" dirty="0"/>
-              <a:t>1</a:t>
-            </a:r>
-          </a:p>
-        </p:txBody>
-      </p:sp>
-      <p:cxnSp>
-        <p:nvCxnSpPr>
-          <p:cNvPr id="18" name="Straight Arrow Connector 17">
-            <a:extLst>
-              <a:ext uri="{FF2B5EF4-FFF2-40B4-BE49-F238E27FC236}">
-                <a16:creationId xmlns:a16="http://schemas.microsoft.com/office/drawing/2014/main" id="{5A856AE9-0B7D-EA0F-8F4B-8813F194AF09}"/>
-              </a:ext>
-            </a:extLst>
-          </p:cNvPr>
-          <p:cNvCxnSpPr>
-            <a:cxnSpLocks/>
-            <a:endCxn id="10" idx="2"/>
-          </p:cNvCxnSpPr>
-          <p:nvPr/>
-        </p:nvCxnSpPr>
-        <p:spPr>
-          <a:xfrm flipV="1">
-            <a:off x="4979059" y="1461852"/>
-            <a:ext cx="752762" cy="67294"/>
-          </a:xfrm>
-          <a:prstGeom prst="straightConnector1">
-            <a:avLst/>
-          </a:prstGeom>
-          <a:ln w="19050">
-            <a:tailEnd type="triangle"/>
-          </a:ln>
-        </p:spPr>
-        <p:style>
-          <a:lnRef idx="1">
-            <a:schemeClr val="accent1"/>
-          </a:lnRef>
-          <a:fillRef idx="0">
-            <a:schemeClr val="accent1"/>
-          </a:fillRef>
-          <a:effectRef idx="0">
-            <a:schemeClr val="accent1"/>
-          </a:effectRef>
-          <a:fontRef idx="minor">
-            <a:schemeClr val="tx1"/>
-          </a:fontRef>
-        </p:style>
-      </p:cxnSp>
+            <a:off x="4979059" y="1329244"/>
+            <a:ext cx="1049645" cy="265215"/>
+            <a:chOff x="4979059" y="1329244"/>
+            <a:chExt cx="1049645" cy="265215"/>
+          </a:xfrm>
+        </p:grpSpPr>
+        <p:sp>
+          <p:nvSpPr>
+            <p:cNvPr id="10" name="Flowchart: Connector 9">
+              <a:extLst>
+                <a:ext uri="{FF2B5EF4-FFF2-40B4-BE49-F238E27FC236}">
+                  <a16:creationId xmlns:a16="http://schemas.microsoft.com/office/drawing/2014/main" id="{5CF6DAF0-3FA4-5296-2E98-90113F04339E}"/>
+                </a:ext>
+              </a:extLst>
+            </p:cNvPr>
+            <p:cNvSpPr/>
+            <p:nvPr/>
+          </p:nvSpPr>
+          <p:spPr>
+            <a:xfrm>
+              <a:off x="5731821" y="1329244"/>
+              <a:ext cx="296883" cy="265215"/>
+            </a:xfrm>
+            <a:prstGeom prst="flowChartConnector">
+              <a:avLst/>
+            </a:prstGeom>
+          </p:spPr>
+          <p:style>
+            <a:lnRef idx="2">
+              <a:schemeClr val="accent1">
+                <a:shade val="15000"/>
+              </a:schemeClr>
+            </a:lnRef>
+            <a:fillRef idx="1">
+              <a:schemeClr val="accent1"/>
+            </a:fillRef>
+            <a:effectRef idx="0">
+              <a:schemeClr val="accent1"/>
+            </a:effectRef>
+            <a:fontRef idx="minor">
+              <a:schemeClr val="lt1"/>
+            </a:fontRef>
+          </p:style>
+          <p:txBody>
+            <a:bodyPr rtlCol="0" anchor="ctr"/>
+            <a:lstStyle/>
+            <a:p>
+              <a:pPr algn="ctr"/>
+              <a:r>
+                <a:rPr lang="en-GB" dirty="0"/>
+                <a:t>1</a:t>
+              </a:r>
+            </a:p>
+          </p:txBody>
+        </p:sp>
+        <p:cxnSp>
+          <p:nvCxnSpPr>
+            <p:cNvPr id="18" name="Straight Arrow Connector 17">
+              <a:extLst>
+                <a:ext uri="{FF2B5EF4-FFF2-40B4-BE49-F238E27FC236}">
+                  <a16:creationId xmlns:a16="http://schemas.microsoft.com/office/drawing/2014/main" id="{5A856AE9-0B7D-EA0F-8F4B-8813F194AF09}"/>
+                </a:ext>
+              </a:extLst>
+            </p:cNvPr>
+            <p:cNvCxnSpPr>
+              <a:cxnSpLocks/>
+              <a:endCxn id="10" idx="2"/>
+            </p:cNvCxnSpPr>
+            <p:nvPr/>
+          </p:nvCxnSpPr>
+          <p:spPr>
+            <a:xfrm flipV="1">
+              <a:off x="4979059" y="1461852"/>
+              <a:ext cx="752762" cy="67294"/>
+            </a:xfrm>
+            <a:prstGeom prst="straightConnector1">
+              <a:avLst/>
+            </a:prstGeom>
+            <a:ln w="19050">
+              <a:tailEnd type="triangle"/>
+            </a:ln>
+          </p:spPr>
+          <p:style>
+            <a:lnRef idx="1">
+              <a:schemeClr val="accent1"/>
+            </a:lnRef>
+            <a:fillRef idx="0">
+              <a:schemeClr val="accent1"/>
+            </a:fillRef>
+            <a:effectRef idx="0">
+              <a:schemeClr val="accent1"/>
+            </a:effectRef>
+            <a:fontRef idx="minor">
+              <a:schemeClr val="tx1"/>
+            </a:fontRef>
+          </p:style>
+        </p:cxnSp>
+      </p:grpSp>
       <p:cxnSp>
         <p:nvCxnSpPr>
           <p:cNvPr id="20" name="Straight Arrow Connector 19">

</xml_diff>

<commit_message>
New index details image
</commit_message>
<xml_diff>
--- a/help/images/ImagesForAmadonHelp.pptx
+++ b/help/images/ImagesForAmadonHelp.pptx
@@ -4950,118 +4950,97 @@
           </p:style>
         </p:cxnSp>
       </p:grpSp>
-      <p:grpSp>
-        <p:nvGrpSpPr>
-          <p:cNvPr id="10" name="Group 9">
-            <a:extLst>
-              <a:ext uri="{FF2B5EF4-FFF2-40B4-BE49-F238E27FC236}">
-                <a16:creationId xmlns:a16="http://schemas.microsoft.com/office/drawing/2014/main" id="{323BAFB8-3D6B-076D-1C9C-7E1CEB84ACC9}"/>
-              </a:ext>
-            </a:extLst>
-          </p:cNvPr>
-          <p:cNvGrpSpPr/>
+      <p:sp>
+        <p:nvSpPr>
+          <p:cNvPr id="11" name="Flowchart: Connector 10">
+            <a:extLst>
+              <a:ext uri="{FF2B5EF4-FFF2-40B4-BE49-F238E27FC236}">
+                <a16:creationId xmlns:a16="http://schemas.microsoft.com/office/drawing/2014/main" id="{643DBF59-61B8-1713-AB08-4DB579FFA0BE}"/>
+              </a:ext>
+            </a:extLst>
+          </p:cNvPr>
+          <p:cNvSpPr/>
           <p:nvPr/>
-        </p:nvGrpSpPr>
-        <p:grpSpPr>
+        </p:nvSpPr>
+        <p:spPr>
           <a:xfrm>
-            <a:off x="2765181" y="3407826"/>
-            <a:ext cx="3494777" cy="337697"/>
-            <a:chOff x="2533927" y="1329244"/>
-            <a:chExt cx="3494777" cy="337697"/>
-          </a:xfrm>
-        </p:grpSpPr>
-        <p:sp>
-          <p:nvSpPr>
-            <p:cNvPr id="11" name="Flowchart: Connector 10">
-              <a:extLst>
-                <a:ext uri="{FF2B5EF4-FFF2-40B4-BE49-F238E27FC236}">
-                  <a16:creationId xmlns:a16="http://schemas.microsoft.com/office/drawing/2014/main" id="{643DBF59-61B8-1713-AB08-4DB579FFA0BE}"/>
-                </a:ext>
-              </a:extLst>
-            </p:cNvPr>
-            <p:cNvSpPr/>
-            <p:nvPr/>
-          </p:nvSpPr>
-          <p:spPr>
-            <a:xfrm>
-              <a:off x="5731821" y="1329244"/>
-              <a:ext cx="296883" cy="265215"/>
-            </a:xfrm>
-            <a:prstGeom prst="flowChartConnector">
-              <a:avLst/>
-            </a:prstGeom>
-          </p:spPr>
-          <p:style>
-            <a:lnRef idx="2">
-              <a:schemeClr val="accent1">
-                <a:shade val="15000"/>
-              </a:schemeClr>
-            </a:lnRef>
-            <a:fillRef idx="1">
-              <a:schemeClr val="accent1"/>
-            </a:fillRef>
-            <a:effectRef idx="0">
-              <a:schemeClr val="accent1"/>
-            </a:effectRef>
-            <a:fontRef idx="minor">
-              <a:schemeClr val="lt1"/>
-            </a:fontRef>
-          </p:style>
-          <p:txBody>
-            <a:bodyPr rtlCol="0" anchor="ctr"/>
-            <a:lstStyle/>
-            <a:p>
-              <a:pPr algn="ctr"/>
-              <a:r>
-                <a:rPr lang="en-GB" dirty="0"/>
-                <a:t>3</a:t>
-              </a:r>
-            </a:p>
-          </p:txBody>
-        </p:sp>
-        <p:cxnSp>
-          <p:nvCxnSpPr>
-            <p:cNvPr id="12" name="Straight Arrow Connector 11">
-              <a:extLst>
-                <a:ext uri="{FF2B5EF4-FFF2-40B4-BE49-F238E27FC236}">
-                  <a16:creationId xmlns:a16="http://schemas.microsoft.com/office/drawing/2014/main" id="{492BAC44-E5BB-2A3A-8E3B-202113690AA3}"/>
-                </a:ext>
-              </a:extLst>
-            </p:cNvPr>
-            <p:cNvCxnSpPr>
-              <a:cxnSpLocks/>
-              <a:endCxn id="11" idx="2"/>
-            </p:cNvCxnSpPr>
-            <p:nvPr/>
-          </p:nvCxnSpPr>
-          <p:spPr>
-            <a:xfrm flipV="1">
-              <a:off x="2533927" y="1461852"/>
-              <a:ext cx="3197894" cy="205089"/>
-            </a:xfrm>
-            <a:prstGeom prst="straightConnector1">
-              <a:avLst/>
-            </a:prstGeom>
-            <a:ln w="19050">
-              <a:tailEnd type="triangle"/>
-            </a:ln>
-          </p:spPr>
-          <p:style>
-            <a:lnRef idx="1">
-              <a:schemeClr val="accent1"/>
-            </a:lnRef>
-            <a:fillRef idx="0">
-              <a:schemeClr val="accent1"/>
-            </a:fillRef>
-            <a:effectRef idx="0">
-              <a:schemeClr val="accent1"/>
-            </a:effectRef>
-            <a:fontRef idx="minor">
-              <a:schemeClr val="tx1"/>
-            </a:fontRef>
-          </p:style>
-        </p:cxnSp>
-      </p:grpSp>
+            <a:off x="5963075" y="3407826"/>
+            <a:ext cx="296883" cy="265215"/>
+          </a:xfrm>
+          <a:prstGeom prst="flowChartConnector">
+            <a:avLst/>
+          </a:prstGeom>
+        </p:spPr>
+        <p:style>
+          <a:lnRef idx="2">
+            <a:schemeClr val="accent1">
+              <a:shade val="15000"/>
+            </a:schemeClr>
+          </a:lnRef>
+          <a:fillRef idx="1">
+            <a:schemeClr val="accent1"/>
+          </a:fillRef>
+          <a:effectRef idx="0">
+            <a:schemeClr val="accent1"/>
+          </a:effectRef>
+          <a:fontRef idx="minor">
+            <a:schemeClr val="lt1"/>
+          </a:fontRef>
+        </p:style>
+        <p:txBody>
+          <a:bodyPr rtlCol="0" anchor="ctr"/>
+          <a:lstStyle/>
+          <a:p>
+            <a:pPr algn="ctr"/>
+            <a:r>
+              <a:rPr lang="en-GB" dirty="0"/>
+              <a:t>3</a:t>
+            </a:r>
+          </a:p>
+        </p:txBody>
+      </p:sp>
+      <p:cxnSp>
+        <p:nvCxnSpPr>
+          <p:cNvPr id="12" name="Straight Arrow Connector 11">
+            <a:extLst>
+              <a:ext uri="{FF2B5EF4-FFF2-40B4-BE49-F238E27FC236}">
+                <a16:creationId xmlns:a16="http://schemas.microsoft.com/office/drawing/2014/main" id="{492BAC44-E5BB-2A3A-8E3B-202113690AA3}"/>
+              </a:ext>
+            </a:extLst>
+          </p:cNvPr>
+          <p:cNvCxnSpPr>
+            <a:cxnSpLocks/>
+            <a:endCxn id="11" idx="2"/>
+          </p:cNvCxnSpPr>
+          <p:nvPr/>
+        </p:nvCxnSpPr>
+        <p:spPr>
+          <a:xfrm>
+            <a:off x="3855427" y="3407826"/>
+            <a:ext cx="2107648" cy="132608"/>
+          </a:xfrm>
+          <a:prstGeom prst="straightConnector1">
+            <a:avLst/>
+          </a:prstGeom>
+          <a:ln w="19050">
+            <a:tailEnd type="triangle"/>
+          </a:ln>
+        </p:spPr>
+        <p:style>
+          <a:lnRef idx="1">
+            <a:schemeClr val="accent1"/>
+          </a:lnRef>
+          <a:fillRef idx="0">
+            <a:schemeClr val="accent1"/>
+          </a:fillRef>
+          <a:effectRef idx="0">
+            <a:schemeClr val="accent1"/>
+          </a:effectRef>
+          <a:fontRef idx="minor">
+            <a:schemeClr val="tx1"/>
+          </a:fontRef>
+        </p:style>
+      </p:cxnSp>
       <p:grpSp>
         <p:nvGrpSpPr>
           <p:cNvPr id="14" name="Group 13">
@@ -5174,6 +5153,48 @@
           </p:style>
         </p:cxnSp>
       </p:grpSp>
+      <p:cxnSp>
+        <p:nvCxnSpPr>
+          <p:cNvPr id="20" name="Straight Arrow Connector 19">
+            <a:extLst>
+              <a:ext uri="{FF2B5EF4-FFF2-40B4-BE49-F238E27FC236}">
+                <a16:creationId xmlns:a16="http://schemas.microsoft.com/office/drawing/2014/main" id="{F147C16D-4AA6-D251-6CA1-3EB6306A0F9E}"/>
+              </a:ext>
+            </a:extLst>
+          </p:cNvPr>
+          <p:cNvCxnSpPr>
+            <a:cxnSpLocks/>
+            <a:endCxn id="11" idx="3"/>
+          </p:cNvCxnSpPr>
+          <p:nvPr/>
+        </p:nvCxnSpPr>
+        <p:spPr>
+          <a:xfrm flipV="1">
+            <a:off x="4084027" y="3634201"/>
+            <a:ext cx="1922526" cy="312220"/>
+          </a:xfrm>
+          <a:prstGeom prst="straightConnector1">
+            <a:avLst/>
+          </a:prstGeom>
+          <a:ln w="19050">
+            <a:tailEnd type="triangle"/>
+          </a:ln>
+        </p:spPr>
+        <p:style>
+          <a:lnRef idx="1">
+            <a:schemeClr val="accent1"/>
+          </a:lnRef>
+          <a:fillRef idx="0">
+            <a:schemeClr val="accent1"/>
+          </a:fillRef>
+          <a:effectRef idx="0">
+            <a:schemeClr val="accent1"/>
+          </a:effectRef>
+          <a:fontRef idx="minor">
+            <a:schemeClr val="tx1"/>
+          </a:fontRef>
+        </p:style>
+      </p:cxnSp>
     </p:spTree>
     <p:extLst>
       <p:ext uri="{BB962C8B-B14F-4D97-AF65-F5344CB8AC3E}">
@@ -6043,6 +6064,54 @@
           </a:fontRef>
         </p:style>
       </p:cxnSp>
+      <p:sp>
+        <p:nvSpPr>
+          <p:cNvPr id="43" name="Rectangle 42">
+            <a:extLst>
+              <a:ext uri="{FF2B5EF4-FFF2-40B4-BE49-F238E27FC236}">
+                <a16:creationId xmlns:a16="http://schemas.microsoft.com/office/drawing/2014/main" id="{8D9E889F-8A35-68C7-A1BC-30AE1BAEAD25}"/>
+              </a:ext>
+            </a:extLst>
+          </p:cNvPr>
+          <p:cNvSpPr/>
+          <p:nvPr/>
+        </p:nvSpPr>
+        <p:spPr>
+          <a:xfrm>
+            <a:off x="6321493" y="4698170"/>
+            <a:ext cx="4209939" cy="276999"/>
+          </a:xfrm>
+          <a:prstGeom prst="rect">
+            <a:avLst/>
+          </a:prstGeom>
+          <a:noFill/>
+        </p:spPr>
+        <p:txBody>
+          <a:bodyPr wrap="square" lIns="91440" tIns="45720" rIns="91440" bIns="45720">
+            <a:spAutoFit/>
+          </a:bodyPr>
+          <a:lstStyle/>
+          <a:p>
+            <a:pPr algn="ctr"/>
+            <a:r>
+              <a:rPr lang="en-US" sz="1200" b="0" cap="none" spc="0" dirty="0">
+                <a:ln w="0"/>
+                <a:solidFill>
+                  <a:schemeClr val="accent1"/>
+                </a:solidFill>
+                <a:effectLst>
+                  <a:outerShdw blurRad="38100" dist="25400" dir="5400000" algn="ctr" rotWithShape="0">
+                    <a:srgbClr val="6E747A">
+                      <a:alpha val="43000"/>
+                    </a:srgbClr>
+                  </a:outerShdw>
+                </a:effectLst>
+              </a:rPr>
+              <a:t>rogreis@gmail.com</a:t>
+            </a:r>
+          </a:p>
+        </p:txBody>
+      </p:sp>
     </p:spTree>
     <p:extLst>
       <p:ext uri="{BB962C8B-B14F-4D97-AF65-F5344CB8AC3E}">

</xml_diff>